<commit_message>
add lamina de restrospectiva
</commit_message>
<xml_diff>
--- a/Diciembre - Deck de Metricas.pptx
+++ b/Diciembre - Deck de Metricas.pptx
@@ -204,7 +204,7 @@
           <a:p>
             <a:fld id="{12582E09-F5B8-46D0-B640-243714D5C667}" type="datetimeFigureOut">
               <a:rPr lang="es-PE" smtClean="0"/>
-              <a:t>4/12/23</a:t>
+              <a:t>20/12/23</a:t>
             </a:fld>
             <a:endParaRPr lang="es-PE"/>
           </a:p>
@@ -2911,7 +2911,7 @@
           <a:p>
             <a:fld id="{73BB2AB2-DBF2-40CC-99D7-E7E644EC008C}" type="datetimeFigureOut">
               <a:rPr lang="es-PE" smtClean="0"/>
-              <a:t>4/12/23</a:t>
+              <a:t>20/12/23</a:t>
             </a:fld>
             <a:endParaRPr lang="es-PE"/>
           </a:p>
@@ -3187,7 +3187,7 @@
           <a:p>
             <a:fld id="{73BB2AB2-DBF2-40CC-99D7-E7E644EC008C}" type="datetimeFigureOut">
               <a:rPr lang="es-PE" smtClean="0"/>
-              <a:t>4/12/23</a:t>
+              <a:t>20/12/23</a:t>
             </a:fld>
             <a:endParaRPr lang="es-PE"/>
           </a:p>
@@ -3455,7 +3455,7 @@
           <a:p>
             <a:fld id="{73BB2AB2-DBF2-40CC-99D7-E7E644EC008C}" type="datetimeFigureOut">
               <a:rPr lang="es-PE" smtClean="0"/>
-              <a:t>4/12/23</a:t>
+              <a:t>20/12/23</a:t>
             </a:fld>
             <a:endParaRPr lang="es-PE"/>
           </a:p>
@@ -3870,7 +3870,7 @@
           <a:p>
             <a:fld id="{73BB2AB2-DBF2-40CC-99D7-E7E644EC008C}" type="datetimeFigureOut">
               <a:rPr lang="es-PE" smtClean="0"/>
-              <a:t>4/12/23</a:t>
+              <a:t>20/12/23</a:t>
             </a:fld>
             <a:endParaRPr lang="es-PE"/>
           </a:p>
@@ -4012,7 +4012,7 @@
           <a:p>
             <a:fld id="{73BB2AB2-DBF2-40CC-99D7-E7E644EC008C}" type="datetimeFigureOut">
               <a:rPr lang="es-PE" smtClean="0"/>
-              <a:t>4/12/23</a:t>
+              <a:t>20/12/23</a:t>
             </a:fld>
             <a:endParaRPr lang="es-PE"/>
           </a:p>
@@ -4191,7 +4191,7 @@
           <a:p>
             <a:fld id="{73BB2AB2-DBF2-40CC-99D7-E7E644EC008C}" type="datetimeFigureOut">
               <a:rPr lang="es-PE" smtClean="0"/>
-              <a:t>4/12/23</a:t>
+              <a:t>20/12/23</a:t>
             </a:fld>
             <a:endParaRPr lang="es-PE"/>
           </a:p>
@@ -4504,7 +4504,7 @@
           <a:p>
             <a:fld id="{73BB2AB2-DBF2-40CC-99D7-E7E644EC008C}" type="datetimeFigureOut">
               <a:rPr lang="es-PE" smtClean="0"/>
-              <a:t>4/12/23</a:t>
+              <a:t>20/12/23</a:t>
             </a:fld>
             <a:endParaRPr lang="es-PE"/>
           </a:p>
@@ -4793,7 +4793,7 @@
           <a:p>
             <a:fld id="{73BB2AB2-DBF2-40CC-99D7-E7E644EC008C}" type="datetimeFigureOut">
               <a:rPr lang="es-PE" smtClean="0"/>
-              <a:t>4/12/23</a:t>
+              <a:t>20/12/23</a:t>
             </a:fld>
             <a:endParaRPr lang="es-PE"/>
           </a:p>
@@ -4993,7 +4993,7 @@
           <a:p>
             <a:fld id="{73BB2AB2-DBF2-40CC-99D7-E7E644EC008C}" type="datetimeFigureOut">
               <a:rPr lang="es-PE" smtClean="0"/>
-              <a:t>4/12/23</a:t>
+              <a:t>20/12/23</a:t>
             </a:fld>
             <a:endParaRPr lang="es-PE"/>
           </a:p>
@@ -5203,7 +5203,7 @@
           <a:p>
             <a:fld id="{73BB2AB2-DBF2-40CC-99D7-E7E644EC008C}" type="datetimeFigureOut">
               <a:rPr lang="es-PE" smtClean="0"/>
-              <a:t>4/12/23</a:t>
+              <a:t>20/12/23</a:t>
             </a:fld>
             <a:endParaRPr lang="es-PE"/>
           </a:p>
@@ -5436,7 +5436,7 @@
           <a:p>
             <a:fld id="{1D8BD707-D9CF-40AE-B4C6-C98DA3205C09}" type="datetimeFigureOut">
               <a:rPr lang="en-US"/>
-              <a:t>12/4/23</a:t>
+              <a:t>12/20/23</a:t>
             </a:fld>
             <a:endParaRPr lang="en-US"/>
           </a:p>
@@ -19379,7 +19379,7 @@
           <a:p>
             <a:fld id="{73BB2AB2-DBF2-40CC-99D7-E7E644EC008C}" type="datetimeFigureOut">
               <a:rPr lang="es-PE" smtClean="0"/>
-              <a:t>4/12/23</a:t>
+              <a:t>20/12/23</a:t>
             </a:fld>
             <a:endParaRPr lang="es-PE"/>
           </a:p>
@@ -28834,14 +28834,14 @@
           <p:nvPr>
             <p:extLst>
               <p:ext uri="{D42A27DB-BD31-4B8C-83A1-F6EECF244321}">
-                <p14:modId xmlns:p14="http://schemas.microsoft.com/office/powerpoint/2010/main" val="85081751"/>
+                <p14:modId xmlns:p14="http://schemas.microsoft.com/office/powerpoint/2010/main" val="1238083984"/>
               </p:ext>
             </p:extLst>
           </p:nvPr>
         </p:nvGraphicFramePr>
         <p:xfrm>
-          <a:off x="107256" y="1007241"/>
-          <a:ext cx="8945798" cy="5910277"/>
+          <a:off x="98198" y="610257"/>
+          <a:ext cx="8945798" cy="6226227"/>
         </p:xfrm>
         <a:graphic>
           <a:graphicData uri="http://schemas.openxmlformats.org/drawingml/2006/table">
@@ -28900,7 +28900,7 @@
                   </a:extLst>
                 </a:gridCol>
               </a:tblGrid>
-              <a:tr h="565651">
+              <a:tr h="315950">
                 <a:tc>
                   <a:txBody>
                     <a:bodyPr/>
@@ -29004,7 +29004,7 @@
                         <a:t>Cycle</a:t>
                       </a:r>
                       <a:r>
-                        <a:rPr lang="es-ES" sz="1100">
+                        <a:rPr lang="es-ES" sz="1100" dirty="0">
                           <a:latin typeface="Inter"/>
                         </a:rPr>
                         <a:t> Time*</a:t>
@@ -29056,7 +29056,7 @@
                         <a:buNone/>
                       </a:pPr>
                       <a:r>
-                        <a:rPr lang="es-ES" sz="1100">
+                        <a:rPr lang="es-ES" sz="1100" dirty="0">
                           <a:latin typeface="Inter"/>
                         </a:rPr>
                         <a:t>Deudas </a:t>
@@ -29068,7 +29068,7 @@
                         <a:t>Tecnicas</a:t>
                       </a:r>
                       <a:r>
-                        <a:rPr lang="es-ES" sz="1100">
+                        <a:rPr lang="es-ES" sz="1100" dirty="0">
                           <a:latin typeface="Inter"/>
                         </a:rPr>
                         <a:t>*</a:t>
@@ -29120,7 +29120,7 @@
                         <a:buNone/>
                       </a:pPr>
                       <a:r>
-                        <a:rPr lang="es-ES" sz="1100">
+                        <a:rPr lang="es-ES" sz="1100" dirty="0">
                           <a:latin typeface="Inter"/>
                         </a:rPr>
                         <a:t>Bugs*</a:t>
@@ -29172,7 +29172,7 @@
                         <a:buNone/>
                       </a:pPr>
                       <a:r>
-                        <a:rPr lang="es-ES" sz="1100">
+                        <a:rPr lang="es-ES" sz="1100" dirty="0">
                           <a:latin typeface="Inter"/>
                         </a:rPr>
                         <a:t>Despliegues*</a:t>
@@ -29270,7 +29270,7 @@
                 </a:extLst>
               </a:tr>
               <a:tr h="565651">
-                <a:tc rowSpan="3">
+                <a:tc rowSpan="4">
                   <a:txBody>
                     <a:bodyPr/>
                     <a:lstStyle/>
@@ -30297,6 +30297,487 @@
                 <a:extLst>
                   <a:ext uri="{0D108BD9-81ED-4DB2-BD59-A6C34878D82A}">
                     <a16:rowId xmlns:a16="http://schemas.microsoft.com/office/drawing/2014/main" val="2946370604"/>
+                  </a:ext>
+                </a:extLst>
+              </a:tr>
+              <a:tr h="565651">
+                <a:tc vMerge="1">
+                  <a:txBody>
+                    <a:bodyPr/>
+                    <a:lstStyle/>
+                    <a:p>
+                      <a:pPr algn="ctr"/>
+                      <a:endParaRPr lang="es-ES" sz="1200" noProof="1">
+                        <a:solidFill>
+                          <a:srgbClr val="FFFFFF"/>
+                        </a:solidFill>
+                        <a:latin typeface="Inter"/>
+                      </a:endParaRPr>
+                    </a:p>
+                  </a:txBody>
+                  <a:tcPr anchor="ctr">
+                    <a:lnL w="57150">
+                      <a:solidFill>
+                        <a:schemeClr val="bg1"/>
+                      </a:solidFill>
+                    </a:lnL>
+                    <a:lnR w="57150" cap="flat" cmpd="sng" algn="ctr">
+                      <a:solidFill>
+                        <a:schemeClr val="bg1"/>
+                      </a:solidFill>
+                      <a:prstDash val="solid"/>
+                      <a:round/>
+                      <a:headEnd type="none" w="med" len="med"/>
+                      <a:tailEnd type="none" w="med" len="med"/>
+                    </a:lnR>
+                    <a:lnT w="57150" cap="flat" cmpd="sng" algn="ctr">
+                      <a:solidFill>
+                        <a:schemeClr val="bg1"/>
+                      </a:solidFill>
+                      <a:prstDash val="solid"/>
+                      <a:round/>
+                      <a:headEnd type="none" w="med" len="med"/>
+                      <a:tailEnd type="none" w="med" len="med"/>
+                    </a:lnT>
+                    <a:lnB w="57150">
+                      <a:solidFill>
+                        <a:schemeClr val="bg1"/>
+                      </a:solidFill>
+                    </a:lnB>
+                    <a:solidFill>
+                      <a:srgbClr val="69217A"/>
+                    </a:solidFill>
+                  </a:tcPr>
+                </a:tc>
+                <a:tc>
+                  <a:txBody>
+                    <a:bodyPr/>
+                    <a:lstStyle/>
+                    <a:p>
+                      <a:pPr algn="ctr"/>
+                      <a:r>
+                        <a:rPr lang="es-ES" sz="1050" noProof="1">
+                          <a:solidFill>
+                            <a:schemeClr val="bg1"/>
+                          </a:solidFill>
+                          <a:latin typeface="Inter"/>
+                        </a:rPr>
+                        <a:t>Ticketing</a:t>
+                      </a:r>
+                    </a:p>
+                  </a:txBody>
+                  <a:tcPr anchor="ctr">
+                    <a:lnL w="57150" cap="flat" cmpd="sng" algn="ctr">
+                      <a:solidFill>
+                        <a:schemeClr val="bg1"/>
+                      </a:solidFill>
+                      <a:prstDash val="solid"/>
+                      <a:round/>
+                      <a:headEnd type="none" w="med" len="med"/>
+                      <a:tailEnd type="none" w="med" len="med"/>
+                    </a:lnL>
+                    <a:lnR w="57150" cap="flat" cmpd="sng" algn="ctr">
+                      <a:solidFill>
+                        <a:schemeClr val="bg1"/>
+                      </a:solidFill>
+                      <a:prstDash val="solid"/>
+                      <a:round/>
+                      <a:headEnd type="none" w="med" len="med"/>
+                      <a:tailEnd type="none" w="med" len="med"/>
+                    </a:lnR>
+                    <a:lnT w="57150" cap="flat" cmpd="sng" algn="ctr">
+                      <a:solidFill>
+                        <a:schemeClr val="bg1"/>
+                      </a:solidFill>
+                      <a:prstDash val="solid"/>
+                      <a:round/>
+                      <a:headEnd type="none" w="med" len="med"/>
+                      <a:tailEnd type="none" w="med" len="med"/>
+                    </a:lnT>
+                    <a:lnB w="57150">
+                      <a:solidFill>
+                        <a:schemeClr val="bg1"/>
+                      </a:solidFill>
+                    </a:lnB>
+                    <a:solidFill>
+                      <a:srgbClr val="2AA686"/>
+                    </a:solidFill>
+                  </a:tcPr>
+                </a:tc>
+                <a:tc>
+                  <a:txBody>
+                    <a:bodyPr/>
+                    <a:lstStyle/>
+                    <a:p>
+                      <a:pPr marL="0" marR="0" lvl="0" indent="0" algn="ctr" defTabSz="914400" rtl="0" eaLnBrk="1" fontAlgn="auto" latinLnBrk="0" hangingPunct="1">
+                        <a:lnSpc>
+                          <a:spcPct val="100000"/>
+                        </a:lnSpc>
+                        <a:spcBef>
+                          <a:spcPts val="0"/>
+                        </a:spcBef>
+                        <a:spcAft>
+                          <a:spcPts val="0"/>
+                        </a:spcAft>
+                        <a:buClrTx/>
+                        <a:buSzTx/>
+                        <a:buFontTx/>
+                        <a:buNone/>
+                        <a:tabLst/>
+                        <a:defRPr sz="1100">
+                          <a:solidFill>
+                            <a:srgbClr val="742385"/>
+                          </a:solidFill>
+                        </a:defRPr>
+                      </a:pPr>
+                      <a:r>
+                        <a:t>🟢 16h 44m</a:t>
+                      </a:r>
+                      <a:br/>
+                      <a:r>
+                        <a:t> (⬇ + 16h 44m)</a:t>
+                      </a:r>
+                    </a:p>
+                  </a:txBody>
+                  <a:tcPr anchor="ctr">
+                    <a:lnL w="57150" cap="flat" cmpd="sng" algn="ctr">
+                      <a:solidFill>
+                        <a:schemeClr val="bg1"/>
+                      </a:solidFill>
+                      <a:prstDash val="solid"/>
+                      <a:round/>
+                      <a:headEnd type="none" w="med" len="med"/>
+                      <a:tailEnd type="none" w="med" len="med"/>
+                    </a:lnL>
+                    <a:lnR w="57150" cap="flat" cmpd="sng" algn="ctr">
+                      <a:solidFill>
+                        <a:schemeClr val="bg1"/>
+                      </a:solidFill>
+                      <a:prstDash val="solid"/>
+                      <a:round/>
+                      <a:headEnd type="none" w="med" len="med"/>
+                      <a:tailEnd type="none" w="med" len="med"/>
+                    </a:lnR>
+                    <a:lnT w="57150" cap="flat" cmpd="sng" algn="ctr">
+                      <a:solidFill>
+                        <a:schemeClr val="bg1"/>
+                      </a:solidFill>
+                      <a:prstDash val="solid"/>
+                      <a:round/>
+                      <a:headEnd type="none" w="med" len="med"/>
+                      <a:tailEnd type="none" w="med" len="med"/>
+                    </a:lnT>
+                    <a:lnB w="57150">
+                      <a:solidFill>
+                        <a:schemeClr val="bg1"/>
+                      </a:solidFill>
+                    </a:lnB>
+                    <a:solidFill>
+                      <a:schemeClr val="bg1">
+                        <a:lumMod val="95000"/>
+                      </a:schemeClr>
+                    </a:solidFill>
+                  </a:tcPr>
+                </a:tc>
+                <a:tc>
+                  <a:txBody>
+                    <a:bodyPr/>
+                    <a:lstStyle/>
+                    <a:p>
+                      <a:pPr marL="0" marR="0" lvl="0" indent="0" algn="ctr" defTabSz="914400" rtl="0" eaLnBrk="1" fontAlgn="auto" latinLnBrk="0" hangingPunct="1">
+                        <a:lnSpc>
+                          <a:spcPct val="100000"/>
+                        </a:lnSpc>
+                        <a:spcBef>
+                          <a:spcPts val="0"/>
+                        </a:spcBef>
+                        <a:spcAft>
+                          <a:spcPts val="0"/>
+                        </a:spcAft>
+                        <a:buClrTx/>
+                        <a:buSzTx/>
+                        <a:buFontTx/>
+                        <a:buNone/>
+                        <a:tabLst/>
+                        <a:defRPr sz="1100">
+                          <a:solidFill>
+                            <a:srgbClr val="742385"/>
+                          </a:solidFill>
+                        </a:defRPr>
+                      </a:pPr>
+                      <a:r>
+                        <a:t>3 / 1</a:t>
+                      </a:r>
+                      <a:br/>
+                      <a:r>
+                        <a:t> (=)</a:t>
+                      </a:r>
+                    </a:p>
+                  </a:txBody>
+                  <a:tcPr anchor="ctr">
+                    <a:lnL w="57150" cap="flat" cmpd="sng" algn="ctr">
+                      <a:solidFill>
+                        <a:schemeClr val="bg1"/>
+                      </a:solidFill>
+                      <a:prstDash val="solid"/>
+                      <a:round/>
+                      <a:headEnd type="none" w="med" len="med"/>
+                      <a:tailEnd type="none" w="med" len="med"/>
+                    </a:lnL>
+                    <a:lnR w="57150" cap="flat" cmpd="sng" algn="ctr">
+                      <a:solidFill>
+                        <a:schemeClr val="bg1"/>
+                      </a:solidFill>
+                      <a:prstDash val="solid"/>
+                      <a:round/>
+                      <a:headEnd type="none" w="med" len="med"/>
+                      <a:tailEnd type="none" w="med" len="med"/>
+                    </a:lnR>
+                    <a:lnT w="57150" cap="flat" cmpd="sng" algn="ctr">
+                      <a:solidFill>
+                        <a:schemeClr val="bg1"/>
+                      </a:solidFill>
+                      <a:prstDash val="solid"/>
+                      <a:round/>
+                      <a:headEnd type="none" w="med" len="med"/>
+                      <a:tailEnd type="none" w="med" len="med"/>
+                    </a:lnT>
+                    <a:lnB w="57150">
+                      <a:solidFill>
+                        <a:schemeClr val="bg1"/>
+                      </a:solidFill>
+                    </a:lnB>
+                    <a:solidFill>
+                      <a:schemeClr val="bg1">
+                        <a:lumMod val="95000"/>
+                      </a:schemeClr>
+                    </a:solidFill>
+                  </a:tcPr>
+                </a:tc>
+                <a:tc>
+                  <a:txBody>
+                    <a:bodyPr/>
+                    <a:lstStyle/>
+                    <a:p>
+                      <a:pPr marL="0" marR="0" lvl="0" indent="0" algn="ctr" defTabSz="914400" rtl="0" eaLnBrk="1" fontAlgn="auto" latinLnBrk="0" hangingPunct="1">
+                        <a:lnSpc>
+                          <a:spcPct val="100000"/>
+                        </a:lnSpc>
+                        <a:spcBef>
+                          <a:spcPts val="0"/>
+                        </a:spcBef>
+                        <a:spcAft>
+                          <a:spcPts val="0"/>
+                        </a:spcAft>
+                        <a:buClrTx/>
+                        <a:buSzTx/>
+                        <a:buFontTx/>
+                        <a:buNone/>
+                        <a:tabLst/>
+                        <a:defRPr sz="1100">
+                          <a:solidFill>
+                            <a:srgbClr val="742385"/>
+                          </a:solidFill>
+                        </a:defRPr>
+                      </a:pPr>
+                      <a:r>
+                        <a:t>19 / 1</a:t>
+                      </a:r>
+                      <a:br/>
+                      <a:r>
+                        <a:t> (⬇ + 4.0)</a:t>
+                      </a:r>
+                    </a:p>
+                  </a:txBody>
+                  <a:tcPr anchor="ctr">
+                    <a:lnL w="57150" cap="flat" cmpd="sng" algn="ctr">
+                      <a:solidFill>
+                        <a:schemeClr val="bg1"/>
+                      </a:solidFill>
+                      <a:prstDash val="solid"/>
+                      <a:round/>
+                      <a:headEnd type="none" w="med" len="med"/>
+                      <a:tailEnd type="none" w="med" len="med"/>
+                    </a:lnL>
+                    <a:lnR w="57150" cap="flat" cmpd="sng" algn="ctr">
+                      <a:solidFill>
+                        <a:schemeClr val="bg1"/>
+                      </a:solidFill>
+                      <a:prstDash val="solid"/>
+                      <a:round/>
+                      <a:headEnd type="none" w="med" len="med"/>
+                      <a:tailEnd type="none" w="med" len="med"/>
+                    </a:lnR>
+                    <a:lnT w="57150" cap="flat" cmpd="sng" algn="ctr">
+                      <a:solidFill>
+                        <a:schemeClr val="bg1"/>
+                      </a:solidFill>
+                      <a:prstDash val="solid"/>
+                      <a:round/>
+                      <a:headEnd type="none" w="med" len="med"/>
+                      <a:tailEnd type="none" w="med" len="med"/>
+                    </a:lnT>
+                    <a:lnB w="57150">
+                      <a:solidFill>
+                        <a:schemeClr val="bg1"/>
+                      </a:solidFill>
+                    </a:lnB>
+                    <a:solidFill>
+                      <a:schemeClr val="bg1">
+                        <a:lumMod val="95000"/>
+                      </a:schemeClr>
+                    </a:solidFill>
+                  </a:tcPr>
+                </a:tc>
+                <a:tc>
+                  <a:txBody>
+                    <a:bodyPr/>
+                    <a:lstStyle/>
+                    <a:p>
+                      <a:pPr marL="0" marR="0" lvl="0" indent="0" algn="ctr" defTabSz="914400" rtl="0" eaLnBrk="1" fontAlgn="auto" latinLnBrk="0" hangingPunct="1">
+                        <a:lnSpc>
+                          <a:spcPct val="100000"/>
+                        </a:lnSpc>
+                        <a:spcBef>
+                          <a:spcPts val="0"/>
+                        </a:spcBef>
+                        <a:spcAft>
+                          <a:spcPts val="0"/>
+                        </a:spcAft>
+                        <a:buClrTx/>
+                        <a:buSzTx/>
+                        <a:buFontTx/>
+                        <a:buNone/>
+                        <a:tabLst/>
+                        <a:defRPr sz="1100">
+                          <a:solidFill>
+                            <a:srgbClr val="742385"/>
+                          </a:solidFill>
+                        </a:defRPr>
+                      </a:pPr>
+                      <a:r>
+                        <a:t>44 (29 - 12 - 3)</a:t>
+                      </a:r>
+                      <a:br/>
+                      <a:r>
+                        <a:t> (⬆ + 1.0)</a:t>
+                      </a:r>
+                    </a:p>
+                  </a:txBody>
+                  <a:tcPr anchor="ctr">
+                    <a:lnL w="57150" cap="flat" cmpd="sng" algn="ctr">
+                      <a:solidFill>
+                        <a:schemeClr val="bg1"/>
+                      </a:solidFill>
+                      <a:prstDash val="solid"/>
+                      <a:round/>
+                      <a:headEnd type="none" w="med" len="med"/>
+                      <a:tailEnd type="none" w="med" len="med"/>
+                    </a:lnL>
+                    <a:lnR w="57150" cap="flat" cmpd="sng" algn="ctr">
+                      <a:solidFill>
+                        <a:schemeClr val="bg1"/>
+                      </a:solidFill>
+                      <a:prstDash val="solid"/>
+                      <a:round/>
+                      <a:headEnd type="none" w="med" len="med"/>
+                      <a:tailEnd type="none" w="med" len="med"/>
+                    </a:lnR>
+                    <a:lnT w="57150" cap="flat" cmpd="sng" algn="ctr">
+                      <a:solidFill>
+                        <a:schemeClr val="bg1"/>
+                      </a:solidFill>
+                      <a:prstDash val="solid"/>
+                      <a:round/>
+                      <a:headEnd type="none" w="med" len="med"/>
+                      <a:tailEnd type="none" w="med" len="med"/>
+                    </a:lnT>
+                    <a:lnB w="57150">
+                      <a:solidFill>
+                        <a:schemeClr val="bg1"/>
+                      </a:solidFill>
+                    </a:lnB>
+                    <a:solidFill>
+                      <a:schemeClr val="bg1">
+                        <a:lumMod val="95000"/>
+                      </a:schemeClr>
+                    </a:solidFill>
+                  </a:tcPr>
+                </a:tc>
+                <a:tc>
+                  <a:txBody>
+                    <a:bodyPr/>
+                    <a:lstStyle/>
+                    <a:p>
+                      <a:pPr marL="0" marR="0" lvl="0" indent="0" algn="ctr" defTabSz="914400" rtl="0" eaLnBrk="1" fontAlgn="auto" latinLnBrk="0" hangingPunct="1">
+                        <a:lnSpc>
+                          <a:spcPct val="100000"/>
+                        </a:lnSpc>
+                        <a:spcBef>
+                          <a:spcPts val="0"/>
+                        </a:spcBef>
+                        <a:spcAft>
+                          <a:spcPts val="0"/>
+                        </a:spcAft>
+                        <a:buClrTx/>
+                        <a:buSzTx/>
+                        <a:buFontTx/>
+                        <a:buNone/>
+                        <a:tabLst/>
+                        <a:defRPr sz="1100">
+                          <a:solidFill>
+                            <a:srgbClr val="742385"/>
+                          </a:solidFill>
+                        </a:defRPr>
+                      </a:pPr>
+                      <a:r>
+                        <a:t>85.72% - 9.99% - 4.29%</a:t>
+                      </a:r>
+                      <a:br/>
+                      <a:r>
+                        <a:t> (⬇ + 2.1% / ⬇ + 2.61%)</a:t>
+                      </a:r>
+                    </a:p>
+                  </a:txBody>
+                  <a:tcPr anchor="ctr">
+                    <a:lnL w="57150" cap="flat" cmpd="sng" algn="ctr">
+                      <a:solidFill>
+                        <a:schemeClr val="bg1"/>
+                      </a:solidFill>
+                      <a:prstDash val="solid"/>
+                      <a:round/>
+                      <a:headEnd type="none" w="med" len="med"/>
+                      <a:tailEnd type="none" w="med" len="med"/>
+                    </a:lnL>
+                    <a:lnR w="57150">
+                      <a:solidFill>
+                        <a:schemeClr val="bg1"/>
+                      </a:solidFill>
+                    </a:lnR>
+                    <a:lnT w="57150" cap="flat" cmpd="sng" algn="ctr">
+                      <a:solidFill>
+                        <a:schemeClr val="bg1"/>
+                      </a:solidFill>
+                      <a:prstDash val="solid"/>
+                      <a:round/>
+                      <a:headEnd type="none" w="med" len="med"/>
+                      <a:tailEnd type="none" w="med" len="med"/>
+                    </a:lnT>
+                    <a:lnB w="57150">
+                      <a:solidFill>
+                        <a:schemeClr val="bg1"/>
+                      </a:solidFill>
+                    </a:lnB>
+                    <a:solidFill>
+                      <a:schemeClr val="bg1">
+                        <a:lumMod val="95000"/>
+                      </a:schemeClr>
+                    </a:solidFill>
+                  </a:tcPr>
+                </a:tc>
+                <a:extLst>
+                  <a:ext uri="{0D108BD9-81ED-4DB2-BD59-A6C34878D82A}">
+                    <a16:rowId xmlns:a16="http://schemas.microsoft.com/office/drawing/2014/main" val="512027789"/>
                   </a:ext>
                 </a:extLst>
               </a:tr>
@@ -32587,7 +33068,7 @@
         </p:nvSpPr>
         <p:spPr>
           <a:xfrm>
-            <a:off x="134548" y="-18843"/>
+            <a:off x="134548" y="-29601"/>
             <a:ext cx="8878814" cy="738664"/>
           </a:xfrm>
           <a:prstGeom prst="rect">
@@ -32672,8 +33153,8 @@
         </p:nvSpPr>
         <p:spPr>
           <a:xfrm>
-            <a:off x="125170" y="640817"/>
-            <a:ext cx="8878814" cy="276999"/>
+            <a:off x="6633307" y="251817"/>
+            <a:ext cx="2419747" cy="276999"/>
           </a:xfrm>
           <a:prstGeom prst="rect">
             <a:avLst/>
@@ -32719,7 +33200,7 @@
             </a:lvl1pPr>
           </a:lstStyle>
           <a:p>
-            <a:pPr algn="l">
+            <a:pPr>
               <a:defRPr/>
             </a:pPr>
             <a:r>
@@ -32755,7 +33236,7 @@
         </p:nvSpPr>
         <p:spPr>
           <a:xfrm>
-            <a:off x="9132933" y="1061470"/>
+            <a:off x="9132933" y="996922"/>
             <a:ext cx="2978704" cy="5597023"/>
           </a:xfrm>
           <a:prstGeom prst="roundRect">
@@ -32849,7 +33330,7 @@
         </p:nvGrpSpPr>
         <p:grpSpPr>
           <a:xfrm>
-            <a:off x="9218190" y="1153004"/>
+            <a:off x="9218190" y="1088456"/>
             <a:ext cx="2890523" cy="1305015"/>
             <a:chOff x="9182538" y="1615975"/>
             <a:chExt cx="2899281" cy="1226188"/>
@@ -33124,7 +33605,7 @@
         </p:nvGrpSpPr>
         <p:grpSpPr>
           <a:xfrm>
-            <a:off x="9218190" y="2527221"/>
+            <a:off x="9218190" y="2462673"/>
             <a:ext cx="2813270" cy="846843"/>
             <a:chOff x="9191296" y="2911364"/>
             <a:chExt cx="2813270" cy="846843"/>
@@ -33377,7 +33858,7 @@
         </p:blipFill>
         <p:spPr>
           <a:xfrm>
-            <a:off x="9218189" y="3990796"/>
+            <a:off x="9218189" y="3926248"/>
             <a:ext cx="2804512" cy="2557499"/>
           </a:xfrm>
           <a:prstGeom prst="rect">
@@ -33399,7 +33880,7 @@
         </p:nvSpPr>
         <p:spPr>
           <a:xfrm>
-            <a:off x="9266360" y="3989912"/>
+            <a:off x="9266360" y="3925364"/>
             <a:ext cx="2462925" cy="246221"/>
           </a:xfrm>
           <a:prstGeom prst="rect">
@@ -33446,7 +33927,7 @@
         </p:nvSpPr>
         <p:spPr>
           <a:xfrm>
-            <a:off x="9281429" y="4257554"/>
+            <a:off x="9281429" y="4193006"/>
             <a:ext cx="2751958" cy="2246769"/>
           </a:xfrm>
           <a:prstGeom prst="rect">
@@ -33704,7 +34185,7 @@
         </p:nvGrpSpPr>
         <p:grpSpPr>
           <a:xfrm>
-            <a:off x="9218188" y="3271702"/>
+            <a:off x="9218188" y="3207154"/>
             <a:ext cx="2804512" cy="622731"/>
             <a:chOff x="9182536" y="3647087"/>
             <a:chExt cx="2839545" cy="622731"/>
@@ -35591,6 +36072,25 @@
 </file>
 
 <file path=customXml/item1.xml><?xml version="1.0" encoding="utf-8"?>
+<?mso-contentType ?>
+<FormTemplates xmlns="http://schemas.microsoft.com/sharepoint/v3/contenttype/forms">
+  <Display>DocumentLibraryForm</Display>
+  <Edit>DocumentLibraryForm</Edit>
+  <New>DocumentLibraryForm</New>
+</FormTemplates>
+</file>
+
+<file path=customXml/item2.xml><?xml version="1.0" encoding="utf-8"?>
+<p:properties xmlns:p="http://schemas.microsoft.com/office/2006/metadata/properties" xmlns:xsi="http://www.w3.org/2001/XMLSchema-instance" xmlns:pc="http://schemas.microsoft.com/office/infopath/2007/PartnerControls">
+  <documentManagement>
+    <lcf76f155ced4ddcb4097134ff3c332f xmlns="843b6cfd-4659-48b0-a018-e4b3997e42c7">
+      <Terms xmlns="http://schemas.microsoft.com/office/infopath/2007/PartnerControls"/>
+    </lcf76f155ced4ddcb4097134ff3c332f>
+  </documentManagement>
+</p:properties>
+</file>
+
+<file path=customXml/item3.xml><?xml version="1.0" encoding="utf-8"?>
 <ct:contentTypeSchema xmlns:ct="http://schemas.microsoft.com/office/2006/metadata/contentType" xmlns:ma="http://schemas.microsoft.com/office/2006/metadata/properties/metaAttributes" ct:_="" ma:_="" ma:contentTypeName="Documento" ma:contentTypeID="0x0101008E5B9C5EC3CF4148BC4031F6B405F470" ma:contentTypeVersion="9" ma:contentTypeDescription="Crear nuevo documento." ma:contentTypeScope="" ma:versionID="67c3714abe415bbea9d9520c0cf94218">
   <xsd:schema xmlns:xsd="http://www.w3.org/2001/XMLSchema" xmlns:xs="http://www.w3.org/2001/XMLSchema" xmlns:p="http://schemas.microsoft.com/office/2006/metadata/properties" xmlns:ns2="843b6cfd-4659-48b0-a018-e4b3997e42c7" targetNamespace="http://schemas.microsoft.com/office/2006/metadata/properties" ma:root="true" ma:fieldsID="e7c6c58c12af278f6c46d163fef319dc" ns2:_="">
     <xsd:import namespace="843b6cfd-4659-48b0-a018-e4b3997e42c7"/>
@@ -35762,39 +36262,10 @@
 </ct:contentTypeSchema>
 </file>
 
-<file path=customXml/item2.xml><?xml version="1.0" encoding="utf-8"?>
-<p:properties xmlns:p="http://schemas.microsoft.com/office/2006/metadata/properties" xmlns:xsi="http://www.w3.org/2001/XMLSchema-instance" xmlns:pc="http://schemas.microsoft.com/office/infopath/2007/PartnerControls">
-  <documentManagement>
-    <lcf76f155ced4ddcb4097134ff3c332f xmlns="843b6cfd-4659-48b0-a018-e4b3997e42c7">
-      <Terms xmlns="http://schemas.microsoft.com/office/infopath/2007/PartnerControls"/>
-    </lcf76f155ced4ddcb4097134ff3c332f>
-  </documentManagement>
-</p:properties>
-</file>
-
-<file path=customXml/item3.xml><?xml version="1.0" encoding="utf-8"?>
-<?mso-contentType ?>
-<FormTemplates xmlns="http://schemas.microsoft.com/sharepoint/v3/contenttype/forms">
-  <Display>DocumentLibraryForm</Display>
-  <Edit>DocumentLibraryForm</Edit>
-  <New>DocumentLibraryForm</New>
-</FormTemplates>
-</file>
-
 <file path=customXml/itemProps1.xml><?xml version="1.0" encoding="utf-8"?>
-<ds:datastoreItem xmlns:ds="http://schemas.openxmlformats.org/officeDocument/2006/customXml" ds:itemID="{1B800C36-19B5-49C5-A4B9-24BE22F41600}">
+<ds:datastoreItem xmlns:ds="http://schemas.openxmlformats.org/officeDocument/2006/customXml" ds:itemID="{FDEAD12E-B3C8-45EB-A3E7-12EE093AE31B}">
   <ds:schemaRefs>
-    <ds:schemaRef ds:uri="843b6cfd-4659-48b0-a018-e4b3997e42c7"/>
-    <ds:schemaRef ds:uri="http://purl.org/dc/elements/1.1/"/>
-    <ds:schemaRef ds:uri="http://purl.org/dc/terms/"/>
-    <ds:schemaRef ds:uri="http://schemas.microsoft.com/internal/obd"/>
-    <ds:schemaRef ds:uri="http://schemas.microsoft.com/office/2006/documentManagement/types"/>
-    <ds:schemaRef ds:uri="http://schemas.microsoft.com/office/2006/metadata/contentType"/>
-    <ds:schemaRef ds:uri="http://schemas.microsoft.com/office/2006/metadata/properties"/>
-    <ds:schemaRef ds:uri="http://schemas.microsoft.com/office/2006/metadata/properties/metaAttributes"/>
-    <ds:schemaRef ds:uri="http://schemas.microsoft.com/office/infopath/2007/PartnerControls"/>
-    <ds:schemaRef ds:uri="http://schemas.openxmlformats.org/package/2006/metadata/core-properties"/>
-    <ds:schemaRef ds:uri="http://www.w3.org/2001/XMLSchema"/>
+    <ds:schemaRef ds:uri="http://schemas.microsoft.com/sharepoint/v3/contenttype/forms"/>
   </ds:schemaRefs>
 </ds:datastoreItem>
 </file>
@@ -35816,9 +36287,19 @@
 </file>
 
 <file path=customXml/itemProps3.xml><?xml version="1.0" encoding="utf-8"?>
-<ds:datastoreItem xmlns:ds="http://schemas.openxmlformats.org/officeDocument/2006/customXml" ds:itemID="{FDEAD12E-B3C8-45EB-A3E7-12EE093AE31B}">
+<ds:datastoreItem xmlns:ds="http://schemas.openxmlformats.org/officeDocument/2006/customXml" ds:itemID="{1B800C36-19B5-49C5-A4B9-24BE22F41600}">
   <ds:schemaRefs>
-    <ds:schemaRef ds:uri="http://schemas.microsoft.com/sharepoint/v3/contenttype/forms"/>
+    <ds:schemaRef ds:uri="843b6cfd-4659-48b0-a018-e4b3997e42c7"/>
+    <ds:schemaRef ds:uri="http://purl.org/dc/elements/1.1/"/>
+    <ds:schemaRef ds:uri="http://purl.org/dc/terms/"/>
+    <ds:schemaRef ds:uri="http://schemas.microsoft.com/internal/obd"/>
+    <ds:schemaRef ds:uri="http://schemas.microsoft.com/office/2006/documentManagement/types"/>
+    <ds:schemaRef ds:uri="http://schemas.microsoft.com/office/2006/metadata/contentType"/>
+    <ds:schemaRef ds:uri="http://schemas.microsoft.com/office/2006/metadata/properties"/>
+    <ds:schemaRef ds:uri="http://schemas.microsoft.com/office/2006/metadata/properties/metaAttributes"/>
+    <ds:schemaRef ds:uri="http://schemas.microsoft.com/office/infopath/2007/PartnerControls"/>
+    <ds:schemaRef ds:uri="http://schemas.openxmlformats.org/package/2006/metadata/core-properties"/>
+    <ds:schemaRef ds:uri="http://www.w3.org/2001/XMLSchema"/>
   </ds:schemaRefs>
 </ds:datastoreItem>
 </file>
</xml_diff>